<commit_message>
rebuilding site Tue Feb  8 15:08:52 GMT 2022
</commit_message>
<xml_diff>
--- a/files/presentations/Kerberos.pptx
+++ b/files/presentations/Kerberos.pptx
@@ -23,7 +23,8 @@
     <p:sldId id="275" r:id="rId17"/>
     <p:sldId id="269" r:id="rId18"/>
     <p:sldId id="270" r:id="rId19"/>
-    <p:sldId id="272" r:id="rId20"/>
+    <p:sldId id="277" r:id="rId20"/>
+    <p:sldId id="272" r:id="rId21"/>
   </p:sldIdLst>
   <p:sldSz cx="12192000" cy="6858000"/>
   <p:notesSz cx="6858000" cy="9144000"/>
@@ -269,7 +270,7 @@
           <a:p>
             <a:fld id="{846CE7D5-CF57-46EF-B807-FDD0502418D4}" type="datetimeFigureOut">
               <a:rPr lang="en-GB" smtClean="0"/>
-              <a:t>07/02/2022</a:t>
+              <a:t>08/02/2022</a:t>
             </a:fld>
             <a:endParaRPr lang="en-GB"/>
           </a:p>
@@ -439,7 +440,7 @@
           <a:p>
             <a:fld id="{846CE7D5-CF57-46EF-B807-FDD0502418D4}" type="datetimeFigureOut">
               <a:rPr lang="en-GB" smtClean="0"/>
-              <a:t>07/02/2022</a:t>
+              <a:t>08/02/2022</a:t>
             </a:fld>
             <a:endParaRPr lang="en-GB"/>
           </a:p>
@@ -619,7 +620,7 @@
           <a:p>
             <a:fld id="{846CE7D5-CF57-46EF-B807-FDD0502418D4}" type="datetimeFigureOut">
               <a:rPr lang="en-GB" smtClean="0"/>
-              <a:t>07/02/2022</a:t>
+              <a:t>08/02/2022</a:t>
             </a:fld>
             <a:endParaRPr lang="en-GB"/>
           </a:p>
@@ -789,7 +790,7 @@
           <a:p>
             <a:fld id="{846CE7D5-CF57-46EF-B807-FDD0502418D4}" type="datetimeFigureOut">
               <a:rPr lang="en-GB" smtClean="0"/>
-              <a:t>07/02/2022</a:t>
+              <a:t>08/02/2022</a:t>
             </a:fld>
             <a:endParaRPr lang="en-GB"/>
           </a:p>
@@ -1035,7 +1036,7 @@
           <a:p>
             <a:fld id="{846CE7D5-CF57-46EF-B807-FDD0502418D4}" type="datetimeFigureOut">
               <a:rPr lang="en-GB" smtClean="0"/>
-              <a:t>07/02/2022</a:t>
+              <a:t>08/02/2022</a:t>
             </a:fld>
             <a:endParaRPr lang="en-GB"/>
           </a:p>
@@ -1267,7 +1268,7 @@
           <a:p>
             <a:fld id="{846CE7D5-CF57-46EF-B807-FDD0502418D4}" type="datetimeFigureOut">
               <a:rPr lang="en-GB" smtClean="0"/>
-              <a:t>07/02/2022</a:t>
+              <a:t>08/02/2022</a:t>
             </a:fld>
             <a:endParaRPr lang="en-GB"/>
           </a:p>
@@ -1634,7 +1635,7 @@
           <a:p>
             <a:fld id="{846CE7D5-CF57-46EF-B807-FDD0502418D4}" type="datetimeFigureOut">
               <a:rPr lang="en-GB" smtClean="0"/>
-              <a:t>07/02/2022</a:t>
+              <a:t>08/02/2022</a:t>
             </a:fld>
             <a:endParaRPr lang="en-GB"/>
           </a:p>
@@ -1752,7 +1753,7 @@
           <a:p>
             <a:fld id="{846CE7D5-CF57-46EF-B807-FDD0502418D4}" type="datetimeFigureOut">
               <a:rPr lang="en-GB" smtClean="0"/>
-              <a:t>07/02/2022</a:t>
+              <a:t>08/02/2022</a:t>
             </a:fld>
             <a:endParaRPr lang="en-GB"/>
           </a:p>
@@ -1847,7 +1848,7 @@
           <a:p>
             <a:fld id="{846CE7D5-CF57-46EF-B807-FDD0502418D4}" type="datetimeFigureOut">
               <a:rPr lang="en-GB" smtClean="0"/>
-              <a:t>07/02/2022</a:t>
+              <a:t>08/02/2022</a:t>
             </a:fld>
             <a:endParaRPr lang="en-GB"/>
           </a:p>
@@ -2124,7 +2125,7 @@
           <a:p>
             <a:fld id="{846CE7D5-CF57-46EF-B807-FDD0502418D4}" type="datetimeFigureOut">
               <a:rPr lang="en-GB" smtClean="0"/>
-              <a:t>07/02/2022</a:t>
+              <a:t>08/02/2022</a:t>
             </a:fld>
             <a:endParaRPr lang="en-GB"/>
           </a:p>
@@ -2381,7 +2382,7 @@
           <a:p>
             <a:fld id="{846CE7D5-CF57-46EF-B807-FDD0502418D4}" type="datetimeFigureOut">
               <a:rPr lang="en-GB" smtClean="0"/>
-              <a:t>07/02/2022</a:t>
+              <a:t>08/02/2022</a:t>
             </a:fld>
             <a:endParaRPr lang="en-GB"/>
           </a:p>
@@ -2594,7 +2595,7 @@
           <a:p>
             <a:fld id="{846CE7D5-CF57-46EF-B807-FDD0502418D4}" type="datetimeFigureOut">
               <a:rPr lang="en-GB" smtClean="0"/>
-              <a:t>07/02/2022</a:t>
+              <a:t>08/02/2022</a:t>
             </a:fld>
             <a:endParaRPr lang="en-GB"/>
           </a:p>
@@ -6512,7 +6513,7 @@
         </p:nvSpPr>
         <p:spPr>
           <a:xfrm>
-            <a:off x="1079389" y="3473369"/>
+            <a:off x="5583080" y="345638"/>
             <a:ext cx="3700089" cy="646331"/>
           </a:xfrm>
           <a:custGeom>
@@ -7011,7 +7012,7 @@
         </p:nvSpPr>
         <p:spPr>
           <a:xfrm>
-            <a:off x="2102072" y="4155158"/>
+            <a:off x="6605763" y="1027427"/>
             <a:ext cx="2025063" cy="523220"/>
           </a:xfrm>
           <a:custGeom>
@@ -7616,7 +7617,7 @@
         </p:blipFill>
         <p:spPr>
           <a:xfrm>
-            <a:off x="4229822" y="3796534"/>
+            <a:off x="8733513" y="668803"/>
             <a:ext cx="391568" cy="391568"/>
           </a:xfrm>
           <a:custGeom>
@@ -7722,36 +7723,6 @@
               </a:ext>
             </a:extLst>
           </a:ln>
-        </p:spPr>
-      </p:pic>
-      <p:pic>
-        <p:nvPicPr>
-          <p:cNvPr id="34" name="Picture 12" descr="A picture containing clipart&#10;&#10;Description generated with high confidence">
-            <a:extLst>
-              <a:ext uri="{FF2B5EF4-FFF2-40B4-BE49-F238E27FC236}">
-                <a16:creationId xmlns:a16="http://schemas.microsoft.com/office/drawing/2014/main" id="{A7D98F15-3743-174A-B6C8-DAA6DDE00E65}"/>
-              </a:ext>
-            </a:extLst>
-          </p:cNvPr>
-          <p:cNvPicPr>
-            <a:picLocks noChangeAspect="1"/>
-          </p:cNvPicPr>
-          <p:nvPr/>
-        </p:nvPicPr>
-        <p:blipFill>
-          <a:blip r:embed="rId6"/>
-          <a:stretch>
-            <a:fillRect/>
-          </a:stretch>
-        </p:blipFill>
-        <p:spPr>
-          <a:xfrm>
-            <a:off x="2023725" y="229901"/>
-            <a:ext cx="308310" cy="308310"/>
-          </a:xfrm>
-          <a:prstGeom prst="rect">
-            <a:avLst/>
-          </a:prstGeom>
         </p:spPr>
       </p:pic>
       <p:pic>
@@ -10349,36 +10320,6 @@
           <a:xfrm>
             <a:off x="4863491" y="2600804"/>
             <a:ext cx="523875" cy="514350"/>
-          </a:xfrm>
-          <a:prstGeom prst="rect">
-            <a:avLst/>
-          </a:prstGeom>
-        </p:spPr>
-      </p:pic>
-      <p:pic>
-        <p:nvPicPr>
-          <p:cNvPr id="48" name="Picture 12" descr="A picture containing clipart&#10;&#10;Description generated with high confidence">
-            <a:extLst>
-              <a:ext uri="{FF2B5EF4-FFF2-40B4-BE49-F238E27FC236}">
-                <a16:creationId xmlns:a16="http://schemas.microsoft.com/office/drawing/2014/main" id="{C0B67159-FF40-5244-BA19-274569EBFCAA}"/>
-              </a:ext>
-            </a:extLst>
-          </p:cNvPr>
-          <p:cNvPicPr>
-            <a:picLocks noChangeAspect="1"/>
-          </p:cNvPicPr>
-          <p:nvPr/>
-        </p:nvPicPr>
-        <p:blipFill>
-          <a:blip r:embed="rId5"/>
-          <a:stretch>
-            <a:fillRect/>
-          </a:stretch>
-        </p:blipFill>
-        <p:spPr>
-          <a:xfrm>
-            <a:off x="2023725" y="229901"/>
-            <a:ext cx="308310" cy="308310"/>
           </a:xfrm>
           <a:prstGeom prst="rect">
             <a:avLst/>
@@ -22723,41 +22664,80 @@
       </p:grpSpPr>
       <p:sp>
         <p:nvSpPr>
-          <p:cNvPr id="2" name="Title 1">
+          <p:cNvPr id="5" name="TextBox 4">
             <a:extLst>
               <a:ext uri="{FF2B5EF4-FFF2-40B4-BE49-F238E27FC236}">
-                <a16:creationId xmlns:a16="http://schemas.microsoft.com/office/drawing/2014/main" id="{3A4E772B-C573-4156-8785-EE104096F1B7}"/>
+                <a16:creationId xmlns:a16="http://schemas.microsoft.com/office/drawing/2014/main" id="{4C27AB18-64FE-42F6-AF15-DCF24F899568}"/>
               </a:ext>
             </a:extLst>
           </p:cNvPr>
-          <p:cNvSpPr>
-            <a:spLocks noGrp="1"/>
-          </p:cNvSpPr>
-          <p:nvPr>
-            <p:ph type="title"/>
-          </p:nvPr>
+          <p:cNvSpPr txBox="1"/>
+          <p:nvPr/>
         </p:nvSpPr>
-        <p:spPr/>
+        <p:spPr>
+          <a:xfrm>
+            <a:off x="1564941" y="627609"/>
+            <a:ext cx="3374457" cy="646331"/>
+          </a:xfrm>
+          <a:prstGeom prst="rect">
+            <a:avLst/>
+          </a:prstGeom>
+        </p:spPr>
         <p:txBody>
-          <a:bodyPr/>
+          <a:bodyPr rot="0" spcFirstLastPara="0" vertOverflow="overflow" horzOverflow="overflow" vert="horz" wrap="square" lIns="91440" tIns="45720" rIns="91440" bIns="45720" numCol="1" spcCol="0" rtlCol="0" fromWordArt="0" anchor="t" anchorCtr="0" forceAA="0" compatLnSpc="1">
+            <a:prstTxWarp prst="textNoShape">
+              <a:avLst/>
+            </a:prstTxWarp>
+            <a:spAutoFit/>
+          </a:bodyPr>
           <a:lstStyle/>
           <a:p>
             <a:r>
-              <a:rPr lang="en-US" dirty="0">
-                <a:cs typeface="Calibri Light"/>
+              <a:rPr lang="en-US" b="1" dirty="0">
+                <a:solidFill>
+                  <a:schemeClr val="accent6">
+                    <a:lumMod val="75000"/>
+                  </a:schemeClr>
+                </a:solidFill>
+                <a:latin typeface="Inconsolata" pitchFamily="49" charset="77"/>
+                <a:ea typeface="Inconsolata" pitchFamily="49" charset="77"/>
               </a:rPr>
-              <a:t>Golden ticket vs Silver ticket </a:t>
-            </a:r>
-            <a:endParaRPr lang="en-US" dirty="0" err="1"/>
+              <a:t>User ID = 101</a:t>
+            </a:r>
+            <a:endParaRPr lang="en-US" dirty="0">
+              <a:solidFill>
+                <a:schemeClr val="accent6">
+                  <a:lumMod val="75000"/>
+                </a:schemeClr>
+              </a:solidFill>
+              <a:latin typeface="Inconsolata" pitchFamily="49" charset="77"/>
+              <a:ea typeface="Inconsolata" pitchFamily="49" charset="77"/>
+              <a:cs typeface="Calibri"/>
+            </a:endParaRPr>
+          </a:p>
+          <a:p>
+            <a:r>
+              <a:rPr lang="en-US" b="1" dirty="0">
+                <a:solidFill>
+                  <a:schemeClr val="accent6">
+                    <a:lumMod val="75000"/>
+                  </a:schemeClr>
+                </a:solidFill>
+                <a:latin typeface="Inconsolata" pitchFamily="49" charset="77"/>
+                <a:ea typeface="Inconsolata" pitchFamily="49" charset="77"/>
+                <a:cs typeface="Calibri"/>
+              </a:rPr>
+              <a:t>IP address = 192.168.180.12</a:t>
+            </a:r>
           </a:p>
         </p:txBody>
       </p:sp>
       <p:pic>
         <p:nvPicPr>
-          <p:cNvPr id="4" name="Picture 4" descr="A close up of a logo&#10;&#10;Description generated with very high confidence">
+          <p:cNvPr id="7" name="Picture 13" descr="A picture containing vector graphics&#10;&#10;Description generated with high confidence">
             <a:extLst>
               <a:ext uri="{FF2B5EF4-FFF2-40B4-BE49-F238E27FC236}">
-                <a16:creationId xmlns:a16="http://schemas.microsoft.com/office/drawing/2014/main" id="{CB1FBE00-C1AE-42C5-A904-5B863AA8AB82}"/>
+                <a16:creationId xmlns:a16="http://schemas.microsoft.com/office/drawing/2014/main" id="{02803C04-3DBF-447E-BAF6-0A06D6D67531}"/>
               </a:ext>
             </a:extLst>
           </p:cNvPr>
@@ -22774,8 +22754,8 @@
         </p:blipFill>
         <p:spPr>
           <a:xfrm>
-            <a:off x="673769" y="1645103"/>
-            <a:ext cx="4227095" cy="1883374"/>
+            <a:off x="644525" y="599535"/>
+            <a:ext cx="874295" cy="874295"/>
           </a:xfrm>
           <a:prstGeom prst="rect">
             <a:avLst/>
@@ -22784,10 +22764,10 @@
       </p:pic>
       <p:pic>
         <p:nvPicPr>
-          <p:cNvPr id="6" name="Picture 6">
+          <p:cNvPr id="9" name="Picture 8" descr="A close up of an animal&#10;&#10;Description generated with high confidence">
             <a:extLst>
               <a:ext uri="{FF2B5EF4-FFF2-40B4-BE49-F238E27FC236}">
-                <a16:creationId xmlns:a16="http://schemas.microsoft.com/office/drawing/2014/main" id="{089B8B3A-8A7F-4452-A28C-9D408B71C9CB}"/>
+                <a16:creationId xmlns:a16="http://schemas.microsoft.com/office/drawing/2014/main" id="{4022057A-DD34-4EB1-BFD2-9CAEA74B9774}"/>
               </a:ext>
             </a:extLst>
           </p:cNvPr>
@@ -22804,8 +22784,873 @@
         </p:blipFill>
         <p:spPr>
           <a:xfrm>
-            <a:off x="6786312" y="3778667"/>
-            <a:ext cx="4264192" cy="2729665"/>
+            <a:off x="6040385" y="1459831"/>
+            <a:ext cx="4741691" cy="5005891"/>
+          </a:xfrm>
+          <a:prstGeom prst="rect">
+            <a:avLst/>
+          </a:prstGeom>
+        </p:spPr>
+      </p:pic>
+      <p:sp>
+        <p:nvSpPr>
+          <p:cNvPr id="10" name="TextBox 9">
+            <a:extLst>
+              <a:ext uri="{FF2B5EF4-FFF2-40B4-BE49-F238E27FC236}">
+                <a16:creationId xmlns:a16="http://schemas.microsoft.com/office/drawing/2014/main" id="{062BDE55-E3D6-454D-87D7-3E307B9AA24B}"/>
+              </a:ext>
+            </a:extLst>
+          </p:cNvPr>
+          <p:cNvSpPr txBox="1"/>
+          <p:nvPr/>
+        </p:nvSpPr>
+        <p:spPr>
+          <a:xfrm>
+            <a:off x="-289927" y="1479846"/>
+            <a:ext cx="2743200" cy="369332"/>
+          </a:xfrm>
+          <a:prstGeom prst="rect">
+            <a:avLst/>
+          </a:prstGeom>
+        </p:spPr>
+        <p:txBody>
+          <a:bodyPr rot="0" spcFirstLastPara="0" vertOverflow="overflow" horzOverflow="overflow" vert="horz" wrap="square" lIns="91440" tIns="45720" rIns="91440" bIns="45720" numCol="1" spcCol="0" rtlCol="0" fromWordArt="0" anchor="t" anchorCtr="0" forceAA="0" compatLnSpc="1">
+            <a:prstTxWarp prst="textNoShape">
+              <a:avLst/>
+            </a:prstTxWarp>
+            <a:spAutoFit/>
+          </a:bodyPr>
+          <a:lstStyle/>
+          <a:p>
+            <a:pPr algn="ctr"/>
+            <a:r>
+              <a:rPr lang="en-US" b="1" u="sng" dirty="0">
+                <a:solidFill>
+                  <a:schemeClr val="accent6">
+                    <a:lumMod val="75000"/>
+                  </a:schemeClr>
+                </a:solidFill>
+                <a:latin typeface="Inconsolata" pitchFamily="49" charset="77"/>
+                <a:ea typeface="Inconsolata" pitchFamily="49" charset="77"/>
+              </a:rPr>
+              <a:t>User</a:t>
+            </a:r>
+          </a:p>
+        </p:txBody>
+      </p:sp>
+      <p:sp>
+        <p:nvSpPr>
+          <p:cNvPr id="11" name="TextBox 10">
+            <a:extLst>
+              <a:ext uri="{FF2B5EF4-FFF2-40B4-BE49-F238E27FC236}">
+                <a16:creationId xmlns:a16="http://schemas.microsoft.com/office/drawing/2014/main" id="{C0C9C2D5-31E9-4E2B-B881-6CB23063793C}"/>
+              </a:ext>
+            </a:extLst>
+          </p:cNvPr>
+          <p:cNvSpPr txBox="1"/>
+          <p:nvPr/>
+        </p:nvSpPr>
+        <p:spPr>
+          <a:xfrm>
+            <a:off x="3252169" y="5529238"/>
+            <a:ext cx="2743200" cy="954107"/>
+          </a:xfrm>
+          <a:prstGeom prst="rect">
+            <a:avLst/>
+          </a:prstGeom>
+        </p:spPr>
+        <p:txBody>
+          <a:bodyPr rot="0" spcFirstLastPara="0" vertOverflow="overflow" horzOverflow="overflow" vert="horz" wrap="square" lIns="91440" tIns="45720" rIns="91440" bIns="45720" numCol="1" spcCol="0" rtlCol="0" fromWordArt="0" anchor="t" anchorCtr="0" forceAA="0" compatLnSpc="1">
+            <a:prstTxWarp prst="textNoShape">
+              <a:avLst/>
+            </a:prstTxWarp>
+            <a:spAutoFit/>
+          </a:bodyPr>
+          <a:lstStyle/>
+          <a:p>
+            <a:pPr algn="ctr"/>
+            <a:r>
+              <a:rPr lang="en-US" sz="2800" b="1" dirty="0">
+                <a:latin typeface="Inconsolata" pitchFamily="49" charset="77"/>
+                <a:ea typeface="Inconsolata" pitchFamily="49" charset="77"/>
+              </a:rPr>
+              <a:t>Kerberos realm 🐕‍🦺🦮🐩</a:t>
+            </a:r>
+            <a:endParaRPr lang="en-US" sz="2800" b="1" dirty="0">
+              <a:latin typeface="Inconsolata" pitchFamily="49" charset="77"/>
+              <a:ea typeface="Inconsolata" pitchFamily="49" charset="77"/>
+              <a:cs typeface="Calibri"/>
+            </a:endParaRPr>
+          </a:p>
+        </p:txBody>
+      </p:sp>
+      <p:sp>
+        <p:nvSpPr>
+          <p:cNvPr id="12" name="TextBox 11">
+            <a:extLst>
+              <a:ext uri="{FF2B5EF4-FFF2-40B4-BE49-F238E27FC236}">
+                <a16:creationId xmlns:a16="http://schemas.microsoft.com/office/drawing/2014/main" id="{992EF033-3561-402A-8952-3CE4F6A53D56}"/>
+              </a:ext>
+            </a:extLst>
+          </p:cNvPr>
+          <p:cNvSpPr txBox="1"/>
+          <p:nvPr/>
+        </p:nvSpPr>
+        <p:spPr>
+          <a:xfrm>
+            <a:off x="7396919" y="1426055"/>
+            <a:ext cx="888332" cy="523220"/>
+          </a:xfrm>
+          <a:prstGeom prst="rect">
+            <a:avLst/>
+          </a:prstGeom>
+        </p:spPr>
+        <p:txBody>
+          <a:bodyPr rot="0" spcFirstLastPara="0" vertOverflow="overflow" horzOverflow="overflow" vert="horz" wrap="square" lIns="91440" tIns="45720" rIns="91440" bIns="45720" numCol="1" spcCol="0" rtlCol="0" fromWordArt="0" anchor="t" anchorCtr="0" forceAA="0" compatLnSpc="1">
+            <a:prstTxWarp prst="textNoShape">
+              <a:avLst/>
+            </a:prstTxWarp>
+            <a:spAutoFit/>
+          </a:bodyPr>
+          <a:lstStyle/>
+          <a:p>
+            <a:pPr algn="ctr"/>
+            <a:r>
+              <a:rPr lang="en-US" sz="2800" b="1" dirty="0">
+                <a:solidFill>
+                  <a:schemeClr val="accent1">
+                    <a:lumMod val="75000"/>
+                  </a:schemeClr>
+                </a:solidFill>
+                <a:latin typeface="Inconsolata" pitchFamily="49" charset="77"/>
+                <a:ea typeface="Inconsolata" pitchFamily="49" charset="77"/>
+              </a:rPr>
+              <a:t>AS</a:t>
+            </a:r>
+            <a:endParaRPr lang="en-US" dirty="0">
+              <a:solidFill>
+                <a:schemeClr val="accent1">
+                  <a:lumMod val="75000"/>
+                </a:schemeClr>
+              </a:solidFill>
+              <a:latin typeface="Inconsolata" pitchFamily="49" charset="77"/>
+              <a:ea typeface="Inconsolata" pitchFamily="49" charset="77"/>
+            </a:endParaRPr>
+          </a:p>
+        </p:txBody>
+      </p:sp>
+      <p:sp>
+        <p:nvSpPr>
+          <p:cNvPr id="14" name="TextBox 13">
+            <a:extLst>
+              <a:ext uri="{FF2B5EF4-FFF2-40B4-BE49-F238E27FC236}">
+                <a16:creationId xmlns:a16="http://schemas.microsoft.com/office/drawing/2014/main" id="{3853CEA0-7CB4-440D-8EF7-4D2E97BBC831}"/>
+              </a:ext>
+            </a:extLst>
+          </p:cNvPr>
+          <p:cNvSpPr txBox="1"/>
+          <p:nvPr/>
+        </p:nvSpPr>
+        <p:spPr>
+          <a:xfrm>
+            <a:off x="9275005" y="748838"/>
+            <a:ext cx="1981199" cy="461665"/>
+          </a:xfrm>
+          <a:prstGeom prst="rect">
+            <a:avLst/>
+          </a:prstGeom>
+        </p:spPr>
+        <p:txBody>
+          <a:bodyPr rot="0" spcFirstLastPara="0" vertOverflow="overflow" horzOverflow="overflow" vert="horz" wrap="square" lIns="91440" tIns="45720" rIns="91440" bIns="45720" numCol="1" spcCol="0" rtlCol="0" fromWordArt="0" anchor="t" anchorCtr="0" forceAA="0" compatLnSpc="1">
+            <a:prstTxWarp prst="textNoShape">
+              <a:avLst/>
+            </a:prstTxWarp>
+            <a:spAutoFit/>
+          </a:bodyPr>
+          <a:lstStyle/>
+          <a:p>
+            <a:pPr algn="ctr"/>
+            <a:r>
+              <a:rPr lang="en-US" sz="2400" b="1" dirty="0">
+                <a:solidFill>
+                  <a:schemeClr val="accent2">
+                    <a:lumMod val="75000"/>
+                  </a:schemeClr>
+                </a:solidFill>
+                <a:latin typeface="Inconsolata" pitchFamily="49" charset="77"/>
+                <a:ea typeface="Inconsolata" pitchFamily="49" charset="77"/>
+              </a:rPr>
+              <a:t>TGS</a:t>
+            </a:r>
+            <a:r>
+              <a:rPr lang="en-US" sz="2400" b="1" dirty="0">
+                <a:solidFill>
+                  <a:schemeClr val="accent2">
+                    <a:lumMod val="75000"/>
+                  </a:schemeClr>
+                </a:solidFill>
+                <a:latin typeface="Inconsolata" pitchFamily="49" charset="77"/>
+                <a:ea typeface="Inconsolata" pitchFamily="49" charset="77"/>
+                <a:cs typeface="Calibri"/>
+              </a:rPr>
+              <a:t> (id=</a:t>
+            </a:r>
+            <a:r>
+              <a:rPr lang="ru-RU" sz="2400" b="1" dirty="0">
+                <a:solidFill>
+                  <a:schemeClr val="accent2">
+                    <a:lumMod val="75000"/>
+                  </a:schemeClr>
+                </a:solidFill>
+                <a:latin typeface="Inconsolata" pitchFamily="49" charset="77"/>
+                <a:ea typeface="Inconsolata" pitchFamily="49" charset="77"/>
+                <a:cs typeface="Calibri"/>
+              </a:rPr>
+              <a:t>3</a:t>
+            </a:r>
+            <a:r>
+              <a:rPr lang="en-US" sz="2400" b="1" dirty="0">
+                <a:solidFill>
+                  <a:schemeClr val="accent2">
+                    <a:lumMod val="75000"/>
+                  </a:schemeClr>
+                </a:solidFill>
+                <a:latin typeface="Inconsolata" pitchFamily="49" charset="77"/>
+                <a:ea typeface="Inconsolata" pitchFamily="49" charset="77"/>
+                <a:cs typeface="Calibri"/>
+              </a:rPr>
+              <a:t>)</a:t>
+            </a:r>
+            <a:endParaRPr lang="en-US" sz="2400" dirty="0">
+              <a:solidFill>
+                <a:schemeClr val="accent2">
+                  <a:lumMod val="75000"/>
+                </a:schemeClr>
+              </a:solidFill>
+              <a:latin typeface="Inconsolata" pitchFamily="49" charset="77"/>
+              <a:ea typeface="Inconsolata" pitchFamily="49" charset="77"/>
+            </a:endParaRPr>
+          </a:p>
+        </p:txBody>
+      </p:sp>
+      <p:sp>
+        <p:nvSpPr>
+          <p:cNvPr id="15" name="TextBox 14">
+            <a:extLst>
+              <a:ext uri="{FF2B5EF4-FFF2-40B4-BE49-F238E27FC236}">
+                <a16:creationId xmlns:a16="http://schemas.microsoft.com/office/drawing/2014/main" id="{9951039F-D748-4D81-A415-AB23BD9858EB}"/>
+              </a:ext>
+            </a:extLst>
+          </p:cNvPr>
+          <p:cNvSpPr txBox="1"/>
+          <p:nvPr/>
+        </p:nvSpPr>
+        <p:spPr>
+          <a:xfrm>
+            <a:off x="10455544" y="2931828"/>
+            <a:ext cx="1736208" cy="461665"/>
+          </a:xfrm>
+          <a:prstGeom prst="rect">
+            <a:avLst/>
+          </a:prstGeom>
+        </p:spPr>
+        <p:txBody>
+          <a:bodyPr rot="0" spcFirstLastPara="0" vertOverflow="overflow" horzOverflow="overflow" vert="horz" wrap="square" lIns="91440" tIns="45720" rIns="91440" bIns="45720" numCol="1" spcCol="0" rtlCol="0" fromWordArt="0" anchor="t" anchorCtr="0" forceAA="0" compatLnSpc="1">
+            <a:prstTxWarp prst="textNoShape">
+              <a:avLst/>
+            </a:prstTxWarp>
+            <a:spAutoFit/>
+          </a:bodyPr>
+          <a:lstStyle/>
+          <a:p>
+            <a:pPr algn="ctr"/>
+            <a:r>
+              <a:rPr lang="en-US" sz="2400" b="1" dirty="0">
+                <a:latin typeface="Inconsolata" pitchFamily="49" charset="77"/>
+                <a:ea typeface="Inconsolata" pitchFamily="49" charset="77"/>
+              </a:rPr>
+              <a:t>HTTP</a:t>
+            </a:r>
+            <a:r>
+              <a:rPr lang="en-US" sz="2400" b="1" dirty="0">
+                <a:latin typeface="Inconsolata" pitchFamily="49" charset="77"/>
+                <a:ea typeface="Inconsolata" pitchFamily="49" charset="77"/>
+                <a:cs typeface="Calibri"/>
+              </a:rPr>
+              <a:t>(id=8)</a:t>
+            </a:r>
+            <a:endParaRPr lang="en-US" sz="2400" dirty="0">
+              <a:latin typeface="Inconsolata" pitchFamily="49" charset="77"/>
+              <a:ea typeface="Inconsolata" pitchFamily="49" charset="77"/>
+            </a:endParaRPr>
+          </a:p>
+        </p:txBody>
+      </p:sp>
+      <p:sp>
+        <p:nvSpPr>
+          <p:cNvPr id="13" name="TextBox 12">
+            <a:extLst>
+              <a:ext uri="{FF2B5EF4-FFF2-40B4-BE49-F238E27FC236}">
+                <a16:creationId xmlns:a16="http://schemas.microsoft.com/office/drawing/2014/main" id="{BF729A54-1AD2-7547-BB71-0975D7108F39}"/>
+              </a:ext>
+            </a:extLst>
+          </p:cNvPr>
+          <p:cNvSpPr txBox="1"/>
+          <p:nvPr/>
+        </p:nvSpPr>
+        <p:spPr>
+          <a:xfrm>
+            <a:off x="778695" y="614736"/>
+            <a:ext cx="697394" cy="584775"/>
+          </a:xfrm>
+          <a:prstGeom prst="rect">
+            <a:avLst/>
+          </a:prstGeom>
+          <a:noFill/>
+        </p:spPr>
+        <p:txBody>
+          <a:bodyPr wrap="square" rtlCol="0">
+            <a:spAutoFit/>
+          </a:bodyPr>
+          <a:lstStyle/>
+          <a:p>
+            <a:r>
+              <a:rPr lang="en-RU" sz="3200" dirty="0"/>
+              <a:t>🤣</a:t>
+            </a:r>
+          </a:p>
+        </p:txBody>
+      </p:sp>
+      <p:sp>
+        <p:nvSpPr>
+          <p:cNvPr id="16" name="TextBox 15">
+            <a:extLst>
+              <a:ext uri="{FF2B5EF4-FFF2-40B4-BE49-F238E27FC236}">
+                <a16:creationId xmlns:a16="http://schemas.microsoft.com/office/drawing/2014/main" id="{07848A80-CF83-0744-A5F2-6524707C3401}"/>
+              </a:ext>
+            </a:extLst>
+          </p:cNvPr>
+          <p:cNvSpPr txBox="1"/>
+          <p:nvPr/>
+        </p:nvSpPr>
+        <p:spPr>
+          <a:xfrm>
+            <a:off x="8135375" y="979107"/>
+            <a:ext cx="697627" cy="707886"/>
+          </a:xfrm>
+          <a:prstGeom prst="rect">
+            <a:avLst/>
+          </a:prstGeom>
+          <a:noFill/>
+        </p:spPr>
+        <p:txBody>
+          <a:bodyPr wrap="none" rtlCol="0">
+            <a:spAutoFit/>
+          </a:bodyPr>
+          <a:lstStyle/>
+          <a:p>
+            <a:r>
+              <a:rPr lang="en-RU" sz="4000" dirty="0"/>
+              <a:t>💂‍♀️</a:t>
+            </a:r>
+          </a:p>
+        </p:txBody>
+      </p:sp>
+      <p:sp>
+        <p:nvSpPr>
+          <p:cNvPr id="19" name="TextBox 18">
+            <a:extLst>
+              <a:ext uri="{FF2B5EF4-FFF2-40B4-BE49-F238E27FC236}">
+                <a16:creationId xmlns:a16="http://schemas.microsoft.com/office/drawing/2014/main" id="{41792E9D-7BF4-9A4B-9B7E-F2DF486B23B4}"/>
+              </a:ext>
+            </a:extLst>
+          </p:cNvPr>
+          <p:cNvSpPr txBox="1"/>
+          <p:nvPr/>
+        </p:nvSpPr>
+        <p:spPr>
+          <a:xfrm>
+            <a:off x="10140504" y="1202847"/>
+            <a:ext cx="646331" cy="646331"/>
+          </a:xfrm>
+          <a:prstGeom prst="rect">
+            <a:avLst/>
+          </a:prstGeom>
+          <a:noFill/>
+        </p:spPr>
+        <p:txBody>
+          <a:bodyPr wrap="none" rtlCol="0">
+            <a:spAutoFit/>
+          </a:bodyPr>
+          <a:lstStyle/>
+          <a:p>
+            <a:r>
+              <a:rPr lang="en-RU" sz="3600" dirty="0"/>
+              <a:t>👨🏼‍💼</a:t>
+            </a:r>
+            <a:endParaRPr lang="en-RU" sz="2000" dirty="0"/>
+          </a:p>
+        </p:txBody>
+      </p:sp>
+      <p:sp>
+        <p:nvSpPr>
+          <p:cNvPr id="24" name="TextBox 23">
+            <a:extLst>
+              <a:ext uri="{FF2B5EF4-FFF2-40B4-BE49-F238E27FC236}">
+                <a16:creationId xmlns:a16="http://schemas.microsoft.com/office/drawing/2014/main" id="{38CFF32A-7252-6A46-86DD-16235C69B353}"/>
+              </a:ext>
+            </a:extLst>
+          </p:cNvPr>
+          <p:cNvSpPr txBox="1"/>
+          <p:nvPr/>
+        </p:nvSpPr>
+        <p:spPr>
+          <a:xfrm>
+            <a:off x="10319476" y="2581483"/>
+            <a:ext cx="543739" cy="523220"/>
+          </a:xfrm>
+          <a:prstGeom prst="rect">
+            <a:avLst/>
+          </a:prstGeom>
+          <a:noFill/>
+        </p:spPr>
+        <p:txBody>
+          <a:bodyPr wrap="none" rtlCol="0">
+            <a:spAutoFit/>
+          </a:bodyPr>
+          <a:lstStyle/>
+          <a:p>
+            <a:r>
+              <a:rPr lang="en-RU" sz="2800" dirty="0"/>
+              <a:t>😵‍💫</a:t>
+            </a:r>
+          </a:p>
+        </p:txBody>
+      </p:sp>
+      <p:pic>
+        <p:nvPicPr>
+          <p:cNvPr id="29" name="Picture 28">
+            <a:extLst>
+              <a:ext uri="{FF2B5EF4-FFF2-40B4-BE49-F238E27FC236}">
+                <a16:creationId xmlns:a16="http://schemas.microsoft.com/office/drawing/2014/main" id="{2F5CB6FB-DFD9-D349-9B4B-1ADC035BC0FD}"/>
+              </a:ext>
+            </a:extLst>
+          </p:cNvPr>
+          <p:cNvPicPr>
+            <a:picLocks noChangeAspect="1"/>
+          </p:cNvPicPr>
+          <p:nvPr/>
+        </p:nvPicPr>
+        <p:blipFill>
+          <a:blip r:embed="rId4"/>
+          <a:stretch>
+            <a:fillRect/>
+          </a:stretch>
+        </p:blipFill>
+        <p:spPr>
+          <a:xfrm>
+            <a:off x="10856657" y="2586872"/>
+            <a:ext cx="379772" cy="352027"/>
+          </a:xfrm>
+          <a:prstGeom prst="rect">
+            <a:avLst/>
+          </a:prstGeom>
+        </p:spPr>
+      </p:pic>
+      <p:pic>
+        <p:nvPicPr>
+          <p:cNvPr id="18" name="Picture 38" descr="A picture containing vector graphics, clipart&#10;&#10;Description generated with high confidence">
+            <a:extLst>
+              <a:ext uri="{FF2B5EF4-FFF2-40B4-BE49-F238E27FC236}">
+                <a16:creationId xmlns:a16="http://schemas.microsoft.com/office/drawing/2014/main" id="{97D4B81C-CE8C-1A47-9D4D-4ADF82A6DE1B}"/>
+              </a:ext>
+            </a:extLst>
+          </p:cNvPr>
+          <p:cNvPicPr>
+            <a:picLocks noChangeAspect="1"/>
+          </p:cNvPicPr>
+          <p:nvPr/>
+        </p:nvPicPr>
+        <p:blipFill>
+          <a:blip r:embed="rId5"/>
+          <a:stretch>
+            <a:fillRect/>
+          </a:stretch>
+        </p:blipFill>
+        <p:spPr>
+          <a:xfrm>
+            <a:off x="1540055" y="184863"/>
+            <a:ext cx="413651" cy="400673"/>
+          </a:xfrm>
+          <a:prstGeom prst="rect">
+            <a:avLst/>
+          </a:prstGeom>
+        </p:spPr>
+      </p:pic>
+      <p:pic>
+        <p:nvPicPr>
+          <p:cNvPr id="20" name="Picture 16" descr="A close up of a logo&#10;&#10;Description generated with high confidence">
+            <a:extLst>
+              <a:ext uri="{FF2B5EF4-FFF2-40B4-BE49-F238E27FC236}">
+                <a16:creationId xmlns:a16="http://schemas.microsoft.com/office/drawing/2014/main" id="{62413B89-765D-F34A-8A78-8BDE7B2CC7F6}"/>
+              </a:ext>
+            </a:extLst>
+          </p:cNvPr>
+          <p:cNvPicPr>
+            <a:picLocks noChangeAspect="1"/>
+          </p:cNvPicPr>
+          <p:nvPr/>
+        </p:nvPicPr>
+        <p:blipFill>
+          <a:blip r:embed="rId6"/>
+          <a:stretch>
+            <a:fillRect/>
+          </a:stretch>
+        </p:blipFill>
+        <p:spPr>
+          <a:xfrm>
+            <a:off x="2375900" y="63716"/>
+            <a:ext cx="490036" cy="605088"/>
+          </a:xfrm>
+          <a:prstGeom prst="rect">
+            <a:avLst/>
+          </a:prstGeom>
+        </p:spPr>
+      </p:pic>
+      <p:pic>
+        <p:nvPicPr>
+          <p:cNvPr id="21" name="Picture 7" descr="A picture containing object&#10;&#10;Description generated with high confidence">
+            <a:extLst>
+              <a:ext uri="{FF2B5EF4-FFF2-40B4-BE49-F238E27FC236}">
+                <a16:creationId xmlns:a16="http://schemas.microsoft.com/office/drawing/2014/main" id="{F1EEE921-221A-4949-BF2D-C5E9A952EFFC}"/>
+              </a:ext>
+            </a:extLst>
+          </p:cNvPr>
+          <p:cNvPicPr>
+            <a:picLocks noChangeAspect="1"/>
+          </p:cNvPicPr>
+          <p:nvPr/>
+        </p:nvPicPr>
+        <p:blipFill>
+          <a:blip r:embed="rId7"/>
+          <a:stretch>
+            <a:fillRect/>
+          </a:stretch>
+        </p:blipFill>
+        <p:spPr>
+          <a:xfrm>
+            <a:off x="3038474" y="215767"/>
+            <a:ext cx="499311" cy="499311"/>
+          </a:xfrm>
+          <a:prstGeom prst="rect">
+            <a:avLst/>
+          </a:prstGeom>
+        </p:spPr>
+      </p:pic>
+      <p:pic>
+        <p:nvPicPr>
+          <p:cNvPr id="22" name="Picture 21" descr="A close up of a logo&#10;&#10;Description generated with high confidence">
+            <a:extLst>
+              <a:ext uri="{FF2B5EF4-FFF2-40B4-BE49-F238E27FC236}">
+                <a16:creationId xmlns:a16="http://schemas.microsoft.com/office/drawing/2014/main" id="{E8826F9B-68F6-764B-ACEE-9A362BBBDE16}"/>
+              </a:ext>
+            </a:extLst>
+          </p:cNvPr>
+          <p:cNvPicPr>
+            <a:picLocks noChangeAspect="1"/>
+          </p:cNvPicPr>
+          <p:nvPr/>
+        </p:nvPicPr>
+        <p:blipFill>
+          <a:blip r:embed="rId8"/>
+          <a:stretch>
+            <a:fillRect/>
+          </a:stretch>
+        </p:blipFill>
+        <p:spPr>
+          <a:xfrm>
+            <a:off x="2932229" y="136795"/>
+            <a:ext cx="355900" cy="355900"/>
+          </a:xfrm>
+          <a:prstGeom prst="rect">
+            <a:avLst/>
+          </a:prstGeom>
+        </p:spPr>
+      </p:pic>
+      <p:pic>
+        <p:nvPicPr>
+          <p:cNvPr id="23" name="Picture 12" descr="A picture containing clipart&#10;&#10;Description generated with high confidence">
+            <a:extLst>
+              <a:ext uri="{FF2B5EF4-FFF2-40B4-BE49-F238E27FC236}">
+                <a16:creationId xmlns:a16="http://schemas.microsoft.com/office/drawing/2014/main" id="{A6909B59-053A-5340-8082-68ABE57647EF}"/>
+              </a:ext>
+            </a:extLst>
+          </p:cNvPr>
+          <p:cNvPicPr>
+            <a:picLocks noChangeAspect="1"/>
+          </p:cNvPicPr>
+          <p:nvPr/>
+        </p:nvPicPr>
+        <p:blipFill>
+          <a:blip r:embed="rId9"/>
+          <a:stretch>
+            <a:fillRect/>
+          </a:stretch>
+        </p:blipFill>
+        <p:spPr>
+          <a:xfrm>
+            <a:off x="11186721" y="2562981"/>
+            <a:ext cx="375918" cy="375918"/>
+          </a:xfrm>
+          <a:prstGeom prst="rect">
+            <a:avLst/>
+          </a:prstGeom>
+        </p:spPr>
+      </p:pic>
+      <p:pic>
+        <p:nvPicPr>
+          <p:cNvPr id="25" name="Picture 26">
+            <a:extLst>
+              <a:ext uri="{FF2B5EF4-FFF2-40B4-BE49-F238E27FC236}">
+                <a16:creationId xmlns:a16="http://schemas.microsoft.com/office/drawing/2014/main" id="{BB333140-502B-0049-B6F8-88DCDBF550C4}"/>
+              </a:ext>
+            </a:extLst>
+          </p:cNvPr>
+          <p:cNvPicPr>
+            <a:picLocks noChangeAspect="1"/>
+          </p:cNvPicPr>
+          <p:nvPr/>
+        </p:nvPicPr>
+        <p:blipFill>
+          <a:blip r:embed="rId10"/>
+          <a:stretch>
+            <a:fillRect/>
+          </a:stretch>
+        </p:blipFill>
+        <p:spPr>
+          <a:xfrm>
+            <a:off x="10780406" y="1251939"/>
+            <a:ext cx="371074" cy="408367"/>
+          </a:xfrm>
+          <a:prstGeom prst="rect">
+            <a:avLst/>
+          </a:prstGeom>
+        </p:spPr>
+      </p:pic>
+      <p:pic>
+        <p:nvPicPr>
+          <p:cNvPr id="26" name="Picture 16" descr="A close up of a logo&#10;&#10;Description generated with high confidence">
+            <a:extLst>
+              <a:ext uri="{FF2B5EF4-FFF2-40B4-BE49-F238E27FC236}">
+                <a16:creationId xmlns:a16="http://schemas.microsoft.com/office/drawing/2014/main" id="{B38C095B-FF64-8641-85E7-DE90AD436A42}"/>
+              </a:ext>
+            </a:extLst>
+          </p:cNvPr>
+          <p:cNvPicPr>
+            <a:picLocks noChangeAspect="1"/>
+          </p:cNvPicPr>
+          <p:nvPr/>
+        </p:nvPicPr>
+        <p:blipFill>
+          <a:blip r:embed="rId6"/>
+          <a:stretch>
+            <a:fillRect/>
+          </a:stretch>
+        </p:blipFill>
+        <p:spPr>
+          <a:xfrm>
+            <a:off x="11079224" y="1151817"/>
+            <a:ext cx="492888" cy="608609"/>
+          </a:xfrm>
+          <a:prstGeom prst="rect">
+            <a:avLst/>
+          </a:prstGeom>
+        </p:spPr>
+      </p:pic>
+      <p:pic>
+        <p:nvPicPr>
+          <p:cNvPr id="27" name="Picture 12" descr="A picture containing clipart&#10;&#10;Description generated with high confidence">
+            <a:extLst>
+              <a:ext uri="{FF2B5EF4-FFF2-40B4-BE49-F238E27FC236}">
+                <a16:creationId xmlns:a16="http://schemas.microsoft.com/office/drawing/2014/main" id="{A1F8347E-7F80-4948-847D-5BB98E5AA475}"/>
+              </a:ext>
+            </a:extLst>
+          </p:cNvPr>
+          <p:cNvPicPr>
+            <a:picLocks noChangeAspect="1"/>
+          </p:cNvPicPr>
+          <p:nvPr/>
+        </p:nvPicPr>
+        <p:blipFill>
+          <a:blip r:embed="rId9"/>
+          <a:stretch>
+            <a:fillRect/>
+          </a:stretch>
+        </p:blipFill>
+        <p:spPr>
+          <a:xfrm>
+            <a:off x="11547475" y="1270690"/>
+            <a:ext cx="425064" cy="425064"/>
+          </a:xfrm>
+          <a:custGeom>
+            <a:avLst/>
+            <a:gdLst>
+              <a:gd name="connsiteX0" fmla="*/ 0 w 425064"/>
+              <a:gd name="connsiteY0" fmla="*/ 0 h 425064"/>
+              <a:gd name="connsiteX1" fmla="*/ 425064 w 425064"/>
+              <a:gd name="connsiteY1" fmla="*/ 0 h 425064"/>
+              <a:gd name="connsiteX2" fmla="*/ 425064 w 425064"/>
+              <a:gd name="connsiteY2" fmla="*/ 425064 h 425064"/>
+              <a:gd name="connsiteX3" fmla="*/ 0 w 425064"/>
+              <a:gd name="connsiteY3" fmla="*/ 425064 h 425064"/>
+              <a:gd name="connsiteX4" fmla="*/ 0 w 425064"/>
+              <a:gd name="connsiteY4" fmla="*/ 0 h 425064"/>
+            </a:gdLst>
+            <a:ahLst/>
+            <a:cxnLst>
+              <a:cxn ang="0">
+                <a:pos x="connsiteX0" y="connsiteY0"/>
+              </a:cxn>
+              <a:cxn ang="0">
+                <a:pos x="connsiteX1" y="connsiteY1"/>
+              </a:cxn>
+              <a:cxn ang="0">
+                <a:pos x="connsiteX2" y="connsiteY2"/>
+              </a:cxn>
+              <a:cxn ang="0">
+                <a:pos x="connsiteX3" y="connsiteY3"/>
+              </a:cxn>
+              <a:cxn ang="0">
+                <a:pos x="connsiteX4" y="connsiteY4"/>
+              </a:cxn>
+            </a:cxnLst>
+            <a:rect l="l" t="t" r="r" b="b"/>
+            <a:pathLst>
+              <a:path w="425064" h="425064" fill="none" extrusionOk="0">
+                <a:moveTo>
+                  <a:pt x="0" y="0"/>
+                </a:moveTo>
+                <a:cubicBezTo>
+                  <a:pt x="114967" y="-2192"/>
+                  <a:pt x="215971" y="7572"/>
+                  <a:pt x="425064" y="0"/>
+                </a:cubicBezTo>
+                <a:cubicBezTo>
+                  <a:pt x="434433" y="134109"/>
+                  <a:pt x="391483" y="246292"/>
+                  <a:pt x="425064" y="425064"/>
+                </a:cubicBezTo>
+                <a:cubicBezTo>
+                  <a:pt x="316858" y="433864"/>
+                  <a:pt x="180965" y="413831"/>
+                  <a:pt x="0" y="425064"/>
+                </a:cubicBezTo>
+                <a:cubicBezTo>
+                  <a:pt x="-22891" y="252403"/>
+                  <a:pt x="39238" y="155782"/>
+                  <a:pt x="0" y="0"/>
+                </a:cubicBezTo>
+                <a:close/>
+              </a:path>
+              <a:path w="425064" h="425064" stroke="0" extrusionOk="0">
+                <a:moveTo>
+                  <a:pt x="0" y="0"/>
+                </a:moveTo>
+                <a:cubicBezTo>
+                  <a:pt x="153595" y="-8640"/>
+                  <a:pt x="237520" y="24604"/>
+                  <a:pt x="425064" y="0"/>
+                </a:cubicBezTo>
+                <a:cubicBezTo>
+                  <a:pt x="431761" y="113296"/>
+                  <a:pt x="401074" y="286631"/>
+                  <a:pt x="425064" y="425064"/>
+                </a:cubicBezTo>
+                <a:cubicBezTo>
+                  <a:pt x="327438" y="449075"/>
+                  <a:pt x="135157" y="409082"/>
+                  <a:pt x="0" y="425064"/>
+                </a:cubicBezTo>
+                <a:cubicBezTo>
+                  <a:pt x="-13984" y="301899"/>
+                  <a:pt x="41994" y="162583"/>
+                  <a:pt x="0" y="0"/>
+                </a:cubicBezTo>
+                <a:close/>
+              </a:path>
+            </a:pathLst>
+          </a:custGeom>
+          <a:ln>
+            <a:noFill/>
+            <a:extLst>
+              <a:ext uri="{C807C97D-BFC1-408E-A445-0C87EB9F89A2}">
+                <ask:lineSketchStyleProps xmlns:ask="http://schemas.microsoft.com/office/drawing/2018/sketchyshapes" sd="3989574929">
+                  <a:prstGeom prst="rect">
+                    <a:avLst/>
+                  </a:prstGeom>
+                  <ask:type>
+                    <ask:lineSketchScribble/>
+                  </ask:type>
+                </ask:lineSketchStyleProps>
+              </a:ext>
+            </a:extLst>
+          </a:ln>
+        </p:spPr>
+      </p:pic>
+      <p:pic>
+        <p:nvPicPr>
+          <p:cNvPr id="28" name="Picture 16" descr="A close up of a logo&#10;&#10;Description generated with high confidence">
+            <a:extLst>
+              <a:ext uri="{FF2B5EF4-FFF2-40B4-BE49-F238E27FC236}">
+                <a16:creationId xmlns:a16="http://schemas.microsoft.com/office/drawing/2014/main" id="{44654973-E633-8741-A16E-C2548777C602}"/>
+              </a:ext>
+            </a:extLst>
+          </p:cNvPr>
+          <p:cNvPicPr>
+            <a:picLocks noChangeAspect="1"/>
+          </p:cNvPicPr>
+          <p:nvPr/>
+        </p:nvPicPr>
+        <p:blipFill>
+          <a:blip r:embed="rId6"/>
+          <a:stretch>
+            <a:fillRect/>
+          </a:stretch>
+        </p:blipFill>
+        <p:spPr>
+          <a:xfrm>
+            <a:off x="7756235" y="917403"/>
+            <a:ext cx="492888" cy="608609"/>
+          </a:xfrm>
+          <a:prstGeom prst="rect">
+            <a:avLst/>
+          </a:prstGeom>
+        </p:spPr>
+      </p:pic>
+      <p:pic>
+        <p:nvPicPr>
+          <p:cNvPr id="31" name="Picture 12" descr="A picture containing clipart&#10;&#10;Description generated with high confidence">
+            <a:extLst>
+              <a:ext uri="{FF2B5EF4-FFF2-40B4-BE49-F238E27FC236}">
+                <a16:creationId xmlns:a16="http://schemas.microsoft.com/office/drawing/2014/main" id="{9A3910B0-306C-9049-BD4A-4E4929418C3C}"/>
+              </a:ext>
+            </a:extLst>
+          </p:cNvPr>
+          <p:cNvPicPr>
+            <a:picLocks noChangeAspect="1"/>
+          </p:cNvPicPr>
+          <p:nvPr/>
+        </p:nvPicPr>
+        <p:blipFill>
+          <a:blip r:embed="rId9"/>
+          <a:stretch>
+            <a:fillRect/>
+          </a:stretch>
+        </p:blipFill>
+        <p:spPr>
+          <a:xfrm>
+            <a:off x="1999128" y="184863"/>
+            <a:ext cx="375918" cy="375918"/>
           </a:xfrm>
           <a:prstGeom prst="rect">
             <a:avLst/>
@@ -22815,7 +23660,7 @@
     </p:spTree>
     <p:extLst>
       <p:ext uri="{BB962C8B-B14F-4D97-AF65-F5344CB8AC3E}">
-        <p14:creationId xmlns:p14="http://schemas.microsoft.com/office/powerpoint/2010/main" val="3991310912"/>
+        <p14:creationId xmlns:p14="http://schemas.microsoft.com/office/powerpoint/2010/main" val="425434190"/>
       </p:ext>
     </p:extLst>
   </p:cSld>
@@ -23501,6 +24346,127 @@
     <p:extLst>
       <p:ext uri="{BB962C8B-B14F-4D97-AF65-F5344CB8AC3E}">
         <p14:creationId xmlns:p14="http://schemas.microsoft.com/office/powerpoint/2010/main" val="2876338569"/>
+      </p:ext>
+    </p:extLst>
+  </p:cSld>
+  <p:clrMapOvr>
+    <a:masterClrMapping/>
+  </p:clrMapOvr>
+</p:sld>
+</file>
+
+<file path=ppt/slides/slide20.xml><?xml version="1.0" encoding="utf-8"?>
+<p:sld xmlns:a="http://schemas.openxmlformats.org/drawingml/2006/main" xmlns:r="http://schemas.openxmlformats.org/officeDocument/2006/relationships" xmlns:p="http://schemas.openxmlformats.org/presentationml/2006/main">
+  <p:cSld>
+    <p:spTree>
+      <p:nvGrpSpPr>
+        <p:cNvPr id="1" name=""/>
+        <p:cNvGrpSpPr/>
+        <p:nvPr/>
+      </p:nvGrpSpPr>
+      <p:grpSpPr>
+        <a:xfrm>
+          <a:off x="0" y="0"/>
+          <a:ext cx="0" cy="0"/>
+          <a:chOff x="0" y="0"/>
+          <a:chExt cx="0" cy="0"/>
+        </a:xfrm>
+      </p:grpSpPr>
+      <p:sp>
+        <p:nvSpPr>
+          <p:cNvPr id="2" name="Title 1">
+            <a:extLst>
+              <a:ext uri="{FF2B5EF4-FFF2-40B4-BE49-F238E27FC236}">
+                <a16:creationId xmlns:a16="http://schemas.microsoft.com/office/drawing/2014/main" id="{3A4E772B-C573-4156-8785-EE104096F1B7}"/>
+              </a:ext>
+            </a:extLst>
+          </p:cNvPr>
+          <p:cNvSpPr>
+            <a:spLocks noGrp="1"/>
+          </p:cNvSpPr>
+          <p:nvPr>
+            <p:ph type="title"/>
+          </p:nvPr>
+        </p:nvSpPr>
+        <p:spPr/>
+        <p:txBody>
+          <a:bodyPr/>
+          <a:lstStyle/>
+          <a:p>
+            <a:r>
+              <a:rPr lang="en-US" dirty="0">
+                <a:cs typeface="Calibri Light"/>
+              </a:rPr>
+              <a:t>Golden ticket vs Silver ticket </a:t>
+            </a:r>
+            <a:endParaRPr lang="en-US" dirty="0" err="1"/>
+          </a:p>
+        </p:txBody>
+      </p:sp>
+      <p:pic>
+        <p:nvPicPr>
+          <p:cNvPr id="4" name="Picture 4" descr="A close up of a logo&#10;&#10;Description generated with very high confidence">
+            <a:extLst>
+              <a:ext uri="{FF2B5EF4-FFF2-40B4-BE49-F238E27FC236}">
+                <a16:creationId xmlns:a16="http://schemas.microsoft.com/office/drawing/2014/main" id="{CB1FBE00-C1AE-42C5-A904-5B863AA8AB82}"/>
+              </a:ext>
+            </a:extLst>
+          </p:cNvPr>
+          <p:cNvPicPr>
+            <a:picLocks noChangeAspect="1"/>
+          </p:cNvPicPr>
+          <p:nvPr/>
+        </p:nvPicPr>
+        <p:blipFill>
+          <a:blip r:embed="rId2"/>
+          <a:stretch>
+            <a:fillRect/>
+          </a:stretch>
+        </p:blipFill>
+        <p:spPr>
+          <a:xfrm>
+            <a:off x="673769" y="1645103"/>
+            <a:ext cx="4227095" cy="1883374"/>
+          </a:xfrm>
+          <a:prstGeom prst="rect">
+            <a:avLst/>
+          </a:prstGeom>
+        </p:spPr>
+      </p:pic>
+      <p:pic>
+        <p:nvPicPr>
+          <p:cNvPr id="6" name="Picture 6">
+            <a:extLst>
+              <a:ext uri="{FF2B5EF4-FFF2-40B4-BE49-F238E27FC236}">
+                <a16:creationId xmlns:a16="http://schemas.microsoft.com/office/drawing/2014/main" id="{089B8B3A-8A7F-4452-A28C-9D408B71C9CB}"/>
+              </a:ext>
+            </a:extLst>
+          </p:cNvPr>
+          <p:cNvPicPr>
+            <a:picLocks noChangeAspect="1"/>
+          </p:cNvPicPr>
+          <p:nvPr/>
+        </p:nvPicPr>
+        <p:blipFill>
+          <a:blip r:embed="rId3"/>
+          <a:stretch>
+            <a:fillRect/>
+          </a:stretch>
+        </p:blipFill>
+        <p:spPr>
+          <a:xfrm>
+            <a:off x="6786312" y="3778667"/>
+            <a:ext cx="4264192" cy="2729665"/>
+          </a:xfrm>
+          <a:prstGeom prst="rect">
+            <a:avLst/>
+          </a:prstGeom>
+        </p:spPr>
+      </p:pic>
+    </p:spTree>
+    <p:extLst>
+      <p:ext uri="{BB962C8B-B14F-4D97-AF65-F5344CB8AC3E}">
+        <p14:creationId xmlns:p14="http://schemas.microsoft.com/office/powerpoint/2010/main" val="3991310912"/>
       </p:ext>
     </p:extLst>
   </p:cSld>
@@ -30241,8 +31207,8 @@
         </p:blipFill>
         <p:spPr>
           <a:xfrm>
-            <a:off x="3532829" y="411482"/>
-            <a:ext cx="585136" cy="585136"/>
+            <a:off x="3364883" y="260969"/>
+            <a:ext cx="413652" cy="413652"/>
           </a:xfrm>
           <a:prstGeom prst="rect">
             <a:avLst/>
@@ -30271,8 +31237,8 @@
         </p:blipFill>
         <p:spPr>
           <a:xfrm>
-            <a:off x="3233501" y="173302"/>
-            <a:ext cx="507539" cy="507539"/>
+            <a:off x="3067804" y="103657"/>
+            <a:ext cx="413651" cy="413651"/>
           </a:xfrm>
           <a:prstGeom prst="rect">
             <a:avLst/>
@@ -37285,10 +38251,10 @@
       </p:pic>
       <p:pic>
         <p:nvPicPr>
-          <p:cNvPr id="29" name="Picture 12" descr="A picture containing clipart&#10;&#10;Description generated with high confidence">
+          <p:cNvPr id="39" name="Picture 38" descr="A picture containing vector graphics, clipart&#10;&#10;Description generated with high confidence">
             <a:extLst>
               <a:ext uri="{FF2B5EF4-FFF2-40B4-BE49-F238E27FC236}">
-                <a16:creationId xmlns:a16="http://schemas.microsoft.com/office/drawing/2014/main" id="{44367DD8-D61D-3C4E-A294-C69296E25B03}"/>
+                <a16:creationId xmlns:a16="http://schemas.microsoft.com/office/drawing/2014/main" id="{C5A399F6-D63A-3645-A614-0DA7D8B4AE52}"/>
               </a:ext>
             </a:extLst>
           </p:cNvPr>
@@ -37305,8 +38271,8 @@
         </p:blipFill>
         <p:spPr>
           <a:xfrm>
-            <a:off x="2023725" y="229901"/>
-            <a:ext cx="308310" cy="308310"/>
+            <a:off x="1540055" y="184863"/>
+            <a:ext cx="413651" cy="400673"/>
           </a:xfrm>
           <a:prstGeom prst="rect">
             <a:avLst/>
@@ -37315,10 +38281,40 @@
       </p:pic>
       <p:pic>
         <p:nvPicPr>
-          <p:cNvPr id="39" name="Picture 38" descr="A picture containing vector graphics, clipart&#10;&#10;Description generated with high confidence">
+          <p:cNvPr id="42" name="Picture 16" descr="A close up of a logo&#10;&#10;Description generated with high confidence">
             <a:extLst>
               <a:ext uri="{FF2B5EF4-FFF2-40B4-BE49-F238E27FC236}">
-                <a16:creationId xmlns:a16="http://schemas.microsoft.com/office/drawing/2014/main" id="{C5A399F6-D63A-3645-A614-0DA7D8B4AE52}"/>
+                <a16:creationId xmlns:a16="http://schemas.microsoft.com/office/drawing/2014/main" id="{7BB5CA08-A21C-7640-8E2F-3AB7C0D0845E}"/>
+              </a:ext>
+            </a:extLst>
+          </p:cNvPr>
+          <p:cNvPicPr>
+            <a:picLocks noChangeAspect="1"/>
+          </p:cNvPicPr>
+          <p:nvPr/>
+        </p:nvPicPr>
+        <p:blipFill>
+          <a:blip r:embed="rId6"/>
+          <a:stretch>
+            <a:fillRect/>
+          </a:stretch>
+        </p:blipFill>
+        <p:spPr>
+          <a:xfrm>
+            <a:off x="2375900" y="63716"/>
+            <a:ext cx="490036" cy="605088"/>
+          </a:xfrm>
+          <a:prstGeom prst="rect">
+            <a:avLst/>
+          </a:prstGeom>
+        </p:spPr>
+      </p:pic>
+      <p:pic>
+        <p:nvPicPr>
+          <p:cNvPr id="49" name="Picture 5" descr="A close up of a logo&#10;&#10;Description generated with high confidence">
+            <a:extLst>
+              <a:ext uri="{FF2B5EF4-FFF2-40B4-BE49-F238E27FC236}">
+                <a16:creationId xmlns:a16="http://schemas.microsoft.com/office/drawing/2014/main" id="{DA0E09A1-FB8E-D442-A288-0CA4C54DE706}"/>
               </a:ext>
             </a:extLst>
           </p:cNvPr>
@@ -37335,8 +38331,8 @@
         </p:blipFill>
         <p:spPr>
           <a:xfrm>
-            <a:off x="1540055" y="184863"/>
-            <a:ext cx="413651" cy="400673"/>
+            <a:off x="10636862" y="545956"/>
+            <a:ext cx="523875" cy="514350"/>
           </a:xfrm>
           <a:prstGeom prst="rect">
             <a:avLst/>
@@ -37345,10 +38341,10 @@
       </p:pic>
       <p:pic>
         <p:nvPicPr>
-          <p:cNvPr id="42" name="Picture 16" descr="A close up of a logo&#10;&#10;Description generated with high confidence">
+          <p:cNvPr id="4" name="Picture 5" descr="A close up of a logo&#10;&#10;Description generated with high confidence">
             <a:extLst>
               <a:ext uri="{FF2B5EF4-FFF2-40B4-BE49-F238E27FC236}">
-                <a16:creationId xmlns:a16="http://schemas.microsoft.com/office/drawing/2014/main" id="{7BB5CA08-A21C-7640-8E2F-3AB7C0D0845E}"/>
+                <a16:creationId xmlns:a16="http://schemas.microsoft.com/office/drawing/2014/main" id="{6CB47401-5B1A-44C5-9726-3585BA9638ED}"/>
               </a:ext>
             </a:extLst>
           </p:cNvPr>
@@ -37358,67 +38354,7 @@
           <p:nvPr/>
         </p:nvPicPr>
         <p:blipFill>
-          <a:blip r:embed="rId6"/>
-          <a:stretch>
-            <a:fillRect/>
-          </a:stretch>
-        </p:blipFill>
-        <p:spPr>
-          <a:xfrm>
-            <a:off x="2375900" y="63716"/>
-            <a:ext cx="490036" cy="605088"/>
-          </a:xfrm>
-          <a:prstGeom prst="rect">
-            <a:avLst/>
-          </a:prstGeom>
-        </p:spPr>
-      </p:pic>
-      <p:pic>
-        <p:nvPicPr>
-          <p:cNvPr id="49" name="Picture 5" descr="A close up of a logo&#10;&#10;Description generated with high confidence">
-            <a:extLst>
-              <a:ext uri="{FF2B5EF4-FFF2-40B4-BE49-F238E27FC236}">
-                <a16:creationId xmlns:a16="http://schemas.microsoft.com/office/drawing/2014/main" id="{DA0E09A1-FB8E-D442-A288-0CA4C54DE706}"/>
-              </a:ext>
-            </a:extLst>
-          </p:cNvPr>
-          <p:cNvPicPr>
-            <a:picLocks noChangeAspect="1"/>
-          </p:cNvPicPr>
-          <p:nvPr/>
-        </p:nvPicPr>
-        <p:blipFill>
-          <a:blip r:embed="rId10"/>
-          <a:stretch>
-            <a:fillRect/>
-          </a:stretch>
-        </p:blipFill>
-        <p:spPr>
-          <a:xfrm>
-            <a:off x="10636862" y="545956"/>
-            <a:ext cx="523875" cy="514350"/>
-          </a:xfrm>
-          <a:prstGeom prst="rect">
-            <a:avLst/>
-          </a:prstGeom>
-        </p:spPr>
-      </p:pic>
-      <p:pic>
-        <p:nvPicPr>
-          <p:cNvPr id="4" name="Picture 5" descr="A close up of a logo&#10;&#10;Description generated with high confidence">
-            <a:extLst>
-              <a:ext uri="{FF2B5EF4-FFF2-40B4-BE49-F238E27FC236}">
-                <a16:creationId xmlns:a16="http://schemas.microsoft.com/office/drawing/2014/main" id="{6CB47401-5B1A-44C5-9726-3585BA9638ED}"/>
-              </a:ext>
-            </a:extLst>
-          </p:cNvPr>
-          <p:cNvPicPr>
-            <a:picLocks noChangeAspect="1"/>
-          </p:cNvPicPr>
-          <p:nvPr/>
-        </p:nvPicPr>
-        <p:blipFill>
-          <a:blip r:embed="rId10"/>
+          <a:blip r:embed="rId9"/>
           <a:stretch>
             <a:fillRect/>
           </a:stretch>

</xml_diff>